<commit_message>
Update Plugfest Nov 2024 summary
</commit_message>
<xml_diff>
--- a/PRESENTATIONS/2024-11-wot-week/Plugfest/plugfest-summary-mkovatsc.pptx
+++ b/PRESENTATIONS/2024-11-wot-week/Plugfest/plugfest-summary-mkovatsc.pptx
@@ -119,17 +119,33 @@
 <pc:chgInfo xmlns:a="http://schemas.openxmlformats.org/drawingml/2006/main" xmlns:r="http://schemas.openxmlformats.org/officeDocument/2006/relationships" xmlns:ac="http://schemas.microsoft.com/office/drawing/2013/main/command" xmlns:pc="http://schemas.microsoft.com/office/powerpoint/2013/main/command">
   <pc:docChgLst>
     <pc:chgData name="Kovatsch, Matthias (SI B PRO TI EAC)" userId="20863ca1-bdcb-4702-9c3b-68e8e242a63d" providerId="ADAL" clId="{18A21688-0152-4784-8214-761ACBB9D3EE}"/>
-    <pc:docChg chg="modSld">
-      <pc:chgData name="Kovatsch, Matthias (SI B PRO TI EAC)" userId="20863ca1-bdcb-4702-9c3b-68e8e242a63d" providerId="ADAL" clId="{18A21688-0152-4784-8214-761ACBB9D3EE}" dt="2024-11-28T09:53:55.525" v="23" actId="20577"/>
+    <pc:docChg chg="custSel modSld">
+      <pc:chgData name="Kovatsch, Matthias (SI B PRO TI EAC)" userId="20863ca1-bdcb-4702-9c3b-68e8e242a63d" providerId="ADAL" clId="{18A21688-0152-4784-8214-761ACBB9D3EE}" dt="2024-11-28T10:00:24.443" v="126" actId="1076"/>
       <pc:docMkLst>
         <pc:docMk/>
       </pc:docMkLst>
       <pc:sldChg chg="modSp mod">
-        <pc:chgData name="Kovatsch, Matthias (SI B PRO TI EAC)" userId="20863ca1-bdcb-4702-9c3b-68e8e242a63d" providerId="ADAL" clId="{18A21688-0152-4784-8214-761ACBB9D3EE}" dt="2024-11-28T09:53:55.525" v="23" actId="20577"/>
+        <pc:chgData name="Kovatsch, Matthias (SI B PRO TI EAC)" userId="20863ca1-bdcb-4702-9c3b-68e8e242a63d" providerId="ADAL" clId="{18A21688-0152-4784-8214-761ACBB9D3EE}" dt="2024-11-28T10:00:24.443" v="126" actId="1076"/>
         <pc:sldMkLst>
           <pc:docMk/>
           <pc:sldMk cId="1255450728" sldId="256"/>
         </pc:sldMkLst>
+        <pc:spChg chg="mod">
+          <ac:chgData name="Kovatsch, Matthias (SI B PRO TI EAC)" userId="20863ca1-bdcb-4702-9c3b-68e8e242a63d" providerId="ADAL" clId="{18A21688-0152-4784-8214-761ACBB9D3EE}" dt="2024-11-28T09:59:39.257" v="116" actId="27636"/>
+          <ac:spMkLst>
+            <pc:docMk/>
+            <pc:sldMk cId="1255450728" sldId="256"/>
+            <ac:spMk id="29" creationId="{10A4F55C-A4AD-8FCA-2675-263876884901}"/>
+          </ac:spMkLst>
+        </pc:spChg>
+        <pc:spChg chg="mod">
+          <ac:chgData name="Kovatsch, Matthias (SI B PRO TI EAC)" userId="20863ca1-bdcb-4702-9c3b-68e8e242a63d" providerId="ADAL" clId="{18A21688-0152-4784-8214-761ACBB9D3EE}" dt="2024-11-28T10:00:24.443" v="126" actId="1076"/>
+          <ac:spMkLst>
+            <pc:docMk/>
+            <pc:sldMk cId="1255450728" sldId="256"/>
+            <ac:spMk id="30" creationId="{F77B17ED-376C-F26A-CC1D-D65EB594E2AD}"/>
+          </ac:spMkLst>
+        </pc:spChg>
         <pc:spChg chg="mod">
           <ac:chgData name="Kovatsch, Matthias (SI B PRO TI EAC)" userId="20863ca1-bdcb-4702-9c3b-68e8e242a63d" providerId="ADAL" clId="{18A21688-0152-4784-8214-761ACBB9D3EE}" dt="2024-11-28T09:53:55.525" v="23" actId="20577"/>
           <ac:spMkLst>
@@ -146,6 +162,14 @@
             <ac:picMk id="22" creationId="{FF054579-35C3-5114-AA67-58603F52368B}"/>
           </ac:picMkLst>
         </pc:picChg>
+        <pc:cxnChg chg="mod">
+          <ac:chgData name="Kovatsch, Matthias (SI B PRO TI EAC)" userId="20863ca1-bdcb-4702-9c3b-68e8e242a63d" providerId="ADAL" clId="{18A21688-0152-4784-8214-761ACBB9D3EE}" dt="2024-11-28T10:00:24.443" v="126" actId="1076"/>
+          <ac:cxnSpMkLst>
+            <pc:docMk/>
+            <pc:sldMk cId="1255450728" sldId="256"/>
+            <ac:cxnSpMk id="32" creationId="{4B4A3C67-C525-2744-5F53-5B735EEE699A}"/>
+          </ac:cxnSpMkLst>
+        </pc:cxnChg>
       </pc:sldChg>
     </pc:docChg>
   </pc:docChgLst>
@@ -3872,18 +3896,42 @@
         <p:spPr>
           <a:xfrm>
             <a:off x="838200" y="1825625"/>
-            <a:ext cx="8510710" cy="4351338"/>
+            <a:ext cx="8510710" cy="4667250"/>
           </a:xfrm>
         </p:spPr>
         <p:txBody>
           <a:bodyPr>
-            <a:normAutofit lnSpcReduction="10000"/>
+            <a:normAutofit fontScale="92500" lnSpcReduction="10000"/>
           </a:bodyPr>
           <a:lstStyle/>
           <a:p>
             <a:r>
               <a:rPr lang="en-US" dirty="0"/>
-              <a:t>Thread-connected KNX IoT devices</a:t>
+              <a:t> </a:t>
+            </a:r>
+            <a:r>
+              <a:rPr lang="en-US" b="1" dirty="0">
+                <a:solidFill>
+                  <a:schemeClr val="accent2"/>
+                </a:solidFill>
+              </a:rPr>
+              <a:t>Thread</a:t>
+            </a:r>
+            <a:r>
+              <a:rPr lang="en-US" dirty="0"/>
+              <a:t>-connected </a:t>
+            </a:r>
+            <a:r>
+              <a:rPr lang="en-US" b="1" dirty="0">
+                <a:solidFill>
+                  <a:schemeClr val="accent3"/>
+                </a:solidFill>
+              </a:rPr>
+              <a:t>KNX IoT</a:t>
+            </a:r>
+            <a:r>
+              <a:rPr lang="en-US" dirty="0"/>
+              <a:t> devices</a:t>
             </a:r>
           </a:p>
           <a:p>
@@ -3917,7 +3965,7 @@
           <a:p>
             <a:r>
               <a:rPr lang="en-US" dirty="0"/>
-              <a:t>Main findings</a:t>
+              <a:t> Main findings</a:t>
             </a:r>
           </a:p>
           <a:p>
@@ -3987,6 +4035,24 @@
               <a:t>Combinations with different security bootstrapping mechanisms</a:t>
             </a:r>
           </a:p>
+          <a:p>
+            <a:pPr lvl="1"/>
+            <a:r>
+              <a:rPr lang="en-US" dirty="0"/>
+              <a:t>Discovery</a:t>
+            </a:r>
+          </a:p>
+          <a:p>
+            <a:pPr lvl="2"/>
+            <a:r>
+              <a:rPr lang="en-US" dirty="0" err="1"/>
+              <a:t>mDNS</a:t>
+            </a:r>
+            <a:r>
+              <a:rPr lang="en-US" dirty="0"/>
+              <a:t> over IPv6 requires a lot of configuration on host OS</a:t>
+            </a:r>
+          </a:p>
         </p:txBody>
       </p:sp>
       <p:sp>
@@ -4003,8 +4069,8 @@
         </p:nvSpPr>
         <p:spPr>
           <a:xfrm>
-            <a:off x="9508980" y="717102"/>
-            <a:ext cx="1037463" cy="369332"/>
+            <a:off x="9186998" y="717102"/>
+            <a:ext cx="1674113" cy="369332"/>
           </a:xfrm>
           <a:prstGeom prst="rect">
             <a:avLst/>
@@ -4023,7 +4089,7 @@
                   <a:schemeClr val="accent1"/>
                 </a:solidFill>
               </a:rPr>
-              <a:t>Ethernet</a:t>
+              <a:t>Ethernet + IPv6</a:t>
             </a:r>
           </a:p>
         </p:txBody>
@@ -4046,7 +4112,7 @@
         <p:spPr>
           <a:xfrm flipV="1">
             <a:off x="10024055" y="1086434"/>
-            <a:ext cx="3657" cy="429634"/>
+            <a:ext cx="0" cy="429634"/>
           </a:xfrm>
           <a:prstGeom prst="line">
             <a:avLst/>

</xml_diff>